<commit_message>
updated JS, HTML & Readme
</commit_message>
<xml_diff>
--- a/WorkDayScheduler-wireframe.pptx
+++ b/WorkDayScheduler-wireframe.pptx
@@ -104,6 +104,11 @@
       </a:defRPr>
     </a:lvl9pPr>
   </p:defaultTextStyle>
+  <p:extLst>
+    <p:ext uri="{EFAFB233-063F-42B5-8137-9DF3F51BA10A}">
+      <p15:sldGuideLst xmlns:p15="http://schemas.microsoft.com/office/powerpoint/2012/main"/>
+    </p:ext>
+  </p:extLst>
 </p:presentation>
 </file>
 
@@ -112,12 +117,12 @@
   <pc:docChgLst>
     <pc:chgData name="ChriS B" userId="4fed6ceee2e70972" providerId="LiveId" clId="{2DE02014-4777-4404-95ED-EC294C16CDF0}"/>
     <pc:docChg chg="custSel modSld">
-      <pc:chgData name="ChriS B" userId="4fed6ceee2e70972" providerId="LiveId" clId="{2DE02014-4777-4404-95ED-EC294C16CDF0}" dt="2021-06-30T09:36:48.525" v="169" actId="404"/>
+      <pc:chgData name="ChriS B" userId="4fed6ceee2e70972" providerId="LiveId" clId="{2DE02014-4777-4404-95ED-EC294C16CDF0}" dt="2021-07-04T06:44:39.260" v="185" actId="5793"/>
       <pc:docMkLst>
         <pc:docMk/>
       </pc:docMkLst>
       <pc:sldChg chg="addSp delSp modSp mod">
-        <pc:chgData name="ChriS B" userId="4fed6ceee2e70972" providerId="LiveId" clId="{2DE02014-4777-4404-95ED-EC294C16CDF0}" dt="2021-06-30T09:36:48.525" v="169" actId="404"/>
+        <pc:chgData name="ChriS B" userId="4fed6ceee2e70972" providerId="LiveId" clId="{2DE02014-4777-4404-95ED-EC294C16CDF0}" dt="2021-07-04T06:44:39.260" v="185" actId="5793"/>
         <pc:sldMkLst>
           <pc:docMk/>
           <pc:sldMk cId="2384861303" sldId="256"/>
@@ -139,7 +144,7 @@
           </ac:spMkLst>
         </pc:spChg>
         <pc:spChg chg="add mod">
-          <ac:chgData name="ChriS B" userId="4fed6ceee2e70972" providerId="LiveId" clId="{2DE02014-4777-4404-95ED-EC294C16CDF0}" dt="2021-06-30T08:52:17.111" v="162" actId="20577"/>
+          <ac:chgData name="ChriS B" userId="4fed6ceee2e70972" providerId="LiveId" clId="{2DE02014-4777-4404-95ED-EC294C16CDF0}" dt="2021-07-04T06:44:39.260" v="185" actId="5793"/>
           <ac:spMkLst>
             <pc:docMk/>
             <pc:sldMk cId="2384861303" sldId="256"/>
@@ -349,7 +354,7 @@
           <a:p>
             <a:fld id="{A7D6A13C-9576-4460-831C-27C37B01CE5F}" type="datetimeFigureOut">
               <a:rPr lang="en-AU" smtClean="0"/>
-              <a:t>30/06/2021</a:t>
+              <a:t>4/07/2021</a:t>
             </a:fld>
             <a:endParaRPr lang="en-AU"/>
           </a:p>
@@ -549,7 +554,7 @@
           <a:p>
             <a:fld id="{A7D6A13C-9576-4460-831C-27C37B01CE5F}" type="datetimeFigureOut">
               <a:rPr lang="en-AU" smtClean="0"/>
-              <a:t>30/06/2021</a:t>
+              <a:t>4/07/2021</a:t>
             </a:fld>
             <a:endParaRPr lang="en-AU"/>
           </a:p>
@@ -759,7 +764,7 @@
           <a:p>
             <a:fld id="{A7D6A13C-9576-4460-831C-27C37B01CE5F}" type="datetimeFigureOut">
               <a:rPr lang="en-AU" smtClean="0"/>
-              <a:t>30/06/2021</a:t>
+              <a:t>4/07/2021</a:t>
             </a:fld>
             <a:endParaRPr lang="en-AU"/>
           </a:p>
@@ -959,7 +964,7 @@
           <a:p>
             <a:fld id="{A7D6A13C-9576-4460-831C-27C37B01CE5F}" type="datetimeFigureOut">
               <a:rPr lang="en-AU" smtClean="0"/>
-              <a:t>30/06/2021</a:t>
+              <a:t>4/07/2021</a:t>
             </a:fld>
             <a:endParaRPr lang="en-AU"/>
           </a:p>
@@ -1235,7 +1240,7 @@
           <a:p>
             <a:fld id="{A7D6A13C-9576-4460-831C-27C37B01CE5F}" type="datetimeFigureOut">
               <a:rPr lang="en-AU" smtClean="0"/>
-              <a:t>30/06/2021</a:t>
+              <a:t>4/07/2021</a:t>
             </a:fld>
             <a:endParaRPr lang="en-AU"/>
           </a:p>
@@ -1503,7 +1508,7 @@
           <a:p>
             <a:fld id="{A7D6A13C-9576-4460-831C-27C37B01CE5F}" type="datetimeFigureOut">
               <a:rPr lang="en-AU" smtClean="0"/>
-              <a:t>30/06/2021</a:t>
+              <a:t>4/07/2021</a:t>
             </a:fld>
             <a:endParaRPr lang="en-AU"/>
           </a:p>
@@ -1918,7 +1923,7 @@
           <a:p>
             <a:fld id="{A7D6A13C-9576-4460-831C-27C37B01CE5F}" type="datetimeFigureOut">
               <a:rPr lang="en-AU" smtClean="0"/>
-              <a:t>30/06/2021</a:t>
+              <a:t>4/07/2021</a:t>
             </a:fld>
             <a:endParaRPr lang="en-AU"/>
           </a:p>
@@ -2060,7 +2065,7 @@
           <a:p>
             <a:fld id="{A7D6A13C-9576-4460-831C-27C37B01CE5F}" type="datetimeFigureOut">
               <a:rPr lang="en-AU" smtClean="0"/>
-              <a:t>30/06/2021</a:t>
+              <a:t>4/07/2021</a:t>
             </a:fld>
             <a:endParaRPr lang="en-AU"/>
           </a:p>
@@ -2173,7 +2178,7 @@
           <a:p>
             <a:fld id="{A7D6A13C-9576-4460-831C-27C37B01CE5F}" type="datetimeFigureOut">
               <a:rPr lang="en-AU" smtClean="0"/>
-              <a:t>30/06/2021</a:t>
+              <a:t>4/07/2021</a:t>
             </a:fld>
             <a:endParaRPr lang="en-AU"/>
           </a:p>
@@ -2486,7 +2491,7 @@
           <a:p>
             <a:fld id="{A7D6A13C-9576-4460-831C-27C37B01CE5F}" type="datetimeFigureOut">
               <a:rPr lang="en-AU" smtClean="0"/>
-              <a:t>30/06/2021</a:t>
+              <a:t>4/07/2021</a:t>
             </a:fld>
             <a:endParaRPr lang="en-AU"/>
           </a:p>
@@ -2775,7 +2780,7 @@
           <a:p>
             <a:fld id="{A7D6A13C-9576-4460-831C-27C37B01CE5F}" type="datetimeFigureOut">
               <a:rPr lang="en-AU" smtClean="0"/>
-              <a:t>30/06/2021</a:t>
+              <a:t>4/07/2021</a:t>
             </a:fld>
             <a:endParaRPr lang="en-AU"/>
           </a:p>
@@ -3018,7 +3023,7 @@
           <a:p>
             <a:fld id="{A7D6A13C-9576-4460-831C-27C37B01CE5F}" type="datetimeFigureOut">
               <a:rPr lang="en-AU" smtClean="0"/>
-              <a:t>30/06/2021</a:t>
+              <a:t>4/07/2021</a:t>
             </a:fld>
             <a:endParaRPr lang="en-AU"/>
           </a:p>
@@ -3786,28 +3791,12 @@
             </a:pPr>
             <a:r>
               <a:rPr lang="en-AU" dirty="0"/>
-              <a:t>80% cards?</a:t>
-            </a:r>
-          </a:p>
-          <a:p>
-            <a:pPr marL="342900" indent="-342900" algn="ctr">
-              <a:buFont typeface="+mj-lt"/>
-              <a:buAutoNum type="arabicPeriod"/>
-            </a:pPr>
-            <a:r>
-              <a:rPr lang="en-AU" dirty="0"/>
-              <a:t>Bootstrap grid?1-10-1?</a:t>
-            </a:r>
-          </a:p>
-          <a:p>
-            <a:pPr marL="342900" indent="-342900" algn="ctr">
-              <a:buFont typeface="+mj-lt"/>
-              <a:buAutoNum type="arabicPeriod"/>
-            </a:pPr>
-            <a:r>
-              <a:rPr lang="en-AU" dirty="0"/>
-              <a:t>Table?</a:t>
-            </a:r>
+              <a:t>Bootstrap grid: 1-1-8-1-1</a:t>
+            </a:r>
+          </a:p>
+          <a:p>
+            <a:pPr algn="ctr"/>
+            <a:endParaRPr lang="en-AU" dirty="0"/>
           </a:p>
         </p:txBody>
       </p:sp>

</xml_diff>